<commit_message>
Fixed issues wrt to rendering Slides in Box/Spiral transition by setting width of root to 0
</commit_message>
<xml_diff>
--- a/hosting/Sample.pptx
+++ b/hosting/Sample.pptx
@@ -3427,6 +3427,36 @@
           </a:p>
         </p:txBody>
       </p:sp>
+      <p:pic>
+        <p:nvPicPr>
+          <p:cNvPr id="3" name="Picture 2" descr="cloudon.png"/>
+          <p:cNvPicPr>
+            <a:picLocks noChangeAspect="1"/>
+          </p:cNvPicPr>
+          <p:nvPr/>
+        </p:nvPicPr>
+        <p:blipFill>
+          <a:blip r:embed="rId2">
+            <a:extLst>
+              <a:ext uri="{28A0092B-C50C-407E-A947-70E740481C1C}">
+                <a14:useLocalDpi xmlns:a14="http://schemas.microsoft.com/office/drawing/2010/main" val="0"/>
+              </a:ext>
+            </a:extLst>
+          </a:blip>
+          <a:stretch>
+            <a:fillRect/>
+          </a:stretch>
+        </p:blipFill>
+        <p:spPr>
+          <a:xfrm>
+            <a:off x="5716174" y="1041185"/>
+            <a:ext cx="1117600" cy="1092200"/>
+          </a:xfrm>
+          <a:prstGeom prst="rect">
+            <a:avLst/>
+          </a:prstGeom>
+        </p:spPr>
+      </p:pic>
     </p:spTree>
     <p:extLst>
       <p:ext uri="{BB962C8B-B14F-4D97-AF65-F5344CB8AC3E}">

</xml_diff>

<commit_message>
Removed image from Sample.pptx
</commit_message>
<xml_diff>
--- a/hosting/Sample.pptx
+++ b/hosting/Sample.pptx
@@ -293,7 +293,7 @@
           <a:p>
             <a:fld id="{2B491A80-1447-2F47-8354-792290EBACE5}" type="datetimeFigureOut">
               <a:rPr lang="en-US" smtClean="0"/>
-              <a:t>7/18/14</a:t>
+              <a:t>10/6/14</a:t>
             </a:fld>
             <a:endParaRPr lang="en-US"/>
           </a:p>
@@ -463,7 +463,7 @@
           <a:p>
             <a:fld id="{2B491A80-1447-2F47-8354-792290EBACE5}" type="datetimeFigureOut">
               <a:rPr lang="en-US" smtClean="0"/>
-              <a:t>7/18/14</a:t>
+              <a:t>10/6/14</a:t>
             </a:fld>
             <a:endParaRPr lang="en-US"/>
           </a:p>
@@ -643,7 +643,7 @@
           <a:p>
             <a:fld id="{2B491A80-1447-2F47-8354-792290EBACE5}" type="datetimeFigureOut">
               <a:rPr lang="en-US" smtClean="0"/>
-              <a:t>7/18/14</a:t>
+              <a:t>10/6/14</a:t>
             </a:fld>
             <a:endParaRPr lang="en-US"/>
           </a:p>
@@ -813,7 +813,7 @@
           <a:p>
             <a:fld id="{2B491A80-1447-2F47-8354-792290EBACE5}" type="datetimeFigureOut">
               <a:rPr lang="en-US" smtClean="0"/>
-              <a:t>7/18/14</a:t>
+              <a:t>10/6/14</a:t>
             </a:fld>
             <a:endParaRPr lang="en-US"/>
           </a:p>
@@ -1059,7 +1059,7 @@
           <a:p>
             <a:fld id="{2B491A80-1447-2F47-8354-792290EBACE5}" type="datetimeFigureOut">
               <a:rPr lang="en-US" smtClean="0"/>
-              <a:t>7/18/14</a:t>
+              <a:t>10/6/14</a:t>
             </a:fld>
             <a:endParaRPr lang="en-US"/>
           </a:p>
@@ -1347,7 +1347,7 @@
           <a:p>
             <a:fld id="{2B491A80-1447-2F47-8354-792290EBACE5}" type="datetimeFigureOut">
               <a:rPr lang="en-US" smtClean="0"/>
-              <a:t>7/18/14</a:t>
+              <a:t>10/6/14</a:t>
             </a:fld>
             <a:endParaRPr lang="en-US"/>
           </a:p>
@@ -1769,7 +1769,7 @@
           <a:p>
             <a:fld id="{2B491A80-1447-2F47-8354-792290EBACE5}" type="datetimeFigureOut">
               <a:rPr lang="en-US" smtClean="0"/>
-              <a:t>7/18/14</a:t>
+              <a:t>10/6/14</a:t>
             </a:fld>
             <a:endParaRPr lang="en-US"/>
           </a:p>
@@ -1887,7 +1887,7 @@
           <a:p>
             <a:fld id="{2B491A80-1447-2F47-8354-792290EBACE5}" type="datetimeFigureOut">
               <a:rPr lang="en-US" smtClean="0"/>
-              <a:t>7/18/14</a:t>
+              <a:t>10/6/14</a:t>
             </a:fld>
             <a:endParaRPr lang="en-US"/>
           </a:p>
@@ -1982,7 +1982,7 @@
           <a:p>
             <a:fld id="{2B491A80-1447-2F47-8354-792290EBACE5}" type="datetimeFigureOut">
               <a:rPr lang="en-US" smtClean="0"/>
-              <a:t>7/18/14</a:t>
+              <a:t>10/6/14</a:t>
             </a:fld>
             <a:endParaRPr lang="en-US"/>
           </a:p>
@@ -2259,7 +2259,7 @@
           <a:p>
             <a:fld id="{2B491A80-1447-2F47-8354-792290EBACE5}" type="datetimeFigureOut">
               <a:rPr lang="en-US" smtClean="0"/>
-              <a:t>7/18/14</a:t>
+              <a:t>10/6/14</a:t>
             </a:fld>
             <a:endParaRPr lang="en-US"/>
           </a:p>
@@ -2512,7 +2512,7 @@
           <a:p>
             <a:fld id="{2B491A80-1447-2F47-8354-792290EBACE5}" type="datetimeFigureOut">
               <a:rPr lang="en-US" smtClean="0"/>
-              <a:t>7/18/14</a:t>
+              <a:t>10/6/14</a:t>
             </a:fld>
             <a:endParaRPr lang="en-US"/>
           </a:p>
@@ -2725,7 +2725,7 @@
           <a:p>
             <a:fld id="{2B491A80-1447-2F47-8354-792290EBACE5}" type="datetimeFigureOut">
               <a:rPr lang="en-US" smtClean="0"/>
-              <a:t>7/18/14</a:t>
+              <a:t>10/6/14</a:t>
             </a:fld>
             <a:endParaRPr lang="en-US"/>
           </a:p>
@@ -3427,36 +3427,6 @@
           </a:p>
         </p:txBody>
       </p:sp>
-      <p:pic>
-        <p:nvPicPr>
-          <p:cNvPr id="3" name="Picture 2" descr="cloudon.png"/>
-          <p:cNvPicPr>
-            <a:picLocks noChangeAspect="1"/>
-          </p:cNvPicPr>
-          <p:nvPr/>
-        </p:nvPicPr>
-        <p:blipFill>
-          <a:blip r:embed="rId2">
-            <a:extLst>
-              <a:ext uri="{28A0092B-C50C-407E-A947-70E740481C1C}">
-                <a14:useLocalDpi xmlns:a14="http://schemas.microsoft.com/office/drawing/2010/main" val="0"/>
-              </a:ext>
-            </a:extLst>
-          </a:blip>
-          <a:stretch>
-            <a:fillRect/>
-          </a:stretch>
-        </p:blipFill>
-        <p:spPr>
-          <a:xfrm>
-            <a:off x="5716174" y="1041185"/>
-            <a:ext cx="1117600" cy="1092200"/>
-          </a:xfrm>
-          <a:prstGeom prst="rect">
-            <a:avLst/>
-          </a:prstGeom>
-        </p:spPr>
-      </p:pic>
     </p:spTree>
     <p:extLst>
       <p:ext uri="{BB962C8B-B14F-4D97-AF65-F5344CB8AC3E}">

</xml_diff>